<commit_message>
Use Intellij instead of Scala IDE
</commit_message>
<xml_diff>
--- a/1_Setup/Setup.pptx
+++ b/1_Setup/Setup.pptx
@@ -9766,6 +9766,16 @@
               <a:buChar char="-"/>
             </a:pPr>
             <a:r>
+              <a:rPr lang="en-US" sz="2000" b="1" dirty="0" err="1">
+                <a:solidFill>
+                  <a:schemeClr val="bg2">
+                    <a:lumMod val="50000"/>
+                  </a:schemeClr>
+                </a:solidFill>
+              </a:rPr>
+              <a:t>Intellij</a:t>
+            </a:r>
+            <a:r>
               <a:rPr lang="en-US" sz="2000" b="1" dirty="0">
                 <a:solidFill>
                   <a:schemeClr val="bg2">
@@ -9773,8 +9783,25 @@
                   </a:schemeClr>
                 </a:solidFill>
               </a:rPr>
-              <a:t>Scala IDE</a:t>
+              <a:t> IDEA + </a:t>
             </a:r>
+            <a:r>
+              <a:rPr lang="en-US" sz="2000" b="1">
+                <a:solidFill>
+                  <a:schemeClr val="bg2">
+                    <a:lumMod val="50000"/>
+                  </a:schemeClr>
+                </a:solidFill>
+              </a:rPr>
+              <a:t>Scala plugin</a:t>
+            </a:r>
+            <a:endParaRPr lang="en-US" sz="2000" b="1" dirty="0">
+              <a:solidFill>
+                <a:schemeClr val="bg2">
+                  <a:lumMod val="50000"/>
+                </a:schemeClr>
+              </a:solidFill>
+            </a:endParaRPr>
           </a:p>
         </p:txBody>
       </p:sp>
@@ -11355,9 +11382,12 @@
 </file>
 
 <file path=customXml/item1.xml><?xml version="1.0" encoding="utf-8"?>
-<p:properties xmlns:p="http://schemas.microsoft.com/office/2006/metadata/properties" xmlns:xsi="http://www.w3.org/2001/XMLSchema-instance" xmlns:pc="http://schemas.microsoft.com/office/infopath/2007/PartnerControls">
-  <documentManagement/>
-</p:properties>
+<?mso-contentType ?>
+<FormTemplates xmlns="http://schemas.microsoft.com/sharepoint/v3/contenttype/forms">
+  <Display>DocumentLibraryForm</Display>
+  <Edit>DocumentLibraryForm</Edit>
+  <New>DocumentLibraryForm</New>
+</FormTemplates>
 </file>
 
 <file path=customXml/item2.xml><?xml version="1.0" encoding="utf-8"?>
@@ -11526,27 +11556,15 @@
 </file>
 
 <file path=customXml/item3.xml><?xml version="1.0" encoding="utf-8"?>
-<?mso-contentType ?>
-<FormTemplates xmlns="http://schemas.microsoft.com/sharepoint/v3/contenttype/forms">
-  <Display>DocumentLibraryForm</Display>
-  <Edit>DocumentLibraryForm</Edit>
-  <New>DocumentLibraryForm</New>
-</FormTemplates>
+<p:properties xmlns:p="http://schemas.microsoft.com/office/2006/metadata/properties" xmlns:xsi="http://www.w3.org/2001/XMLSchema-instance" xmlns:pc="http://schemas.microsoft.com/office/infopath/2007/PartnerControls">
+  <documentManagement/>
+</p:properties>
 </file>
 
 <file path=customXml/itemProps1.xml><?xml version="1.0" encoding="utf-8"?>
-<ds:datastoreItem xmlns:ds="http://schemas.openxmlformats.org/officeDocument/2006/customXml" ds:itemID="{FC42EE84-F11C-42C7-AEE1-990C959312CE}">
+<ds:datastoreItem xmlns:ds="http://schemas.openxmlformats.org/officeDocument/2006/customXml" ds:itemID="{CF9D2C0E-8EC1-40ED-8E3B-49799F2A819F}">
   <ds:schemaRefs>
-    <ds:schemaRef ds:uri="http://schemas.microsoft.com/office/2006/documentManagement/types"/>
-    <ds:schemaRef ds:uri="http://www.w3.org/XML/1998/namespace"/>
-    <ds:schemaRef ds:uri="http://purl.org/dc/terms/"/>
-    <ds:schemaRef ds:uri="http://purl.org/dc/dcmitype/"/>
-    <ds:schemaRef ds:uri="http://schemas.microsoft.com/office/infopath/2007/PartnerControls"/>
-    <ds:schemaRef ds:uri="http://purl.org/dc/elements/1.1/"/>
-    <ds:schemaRef ds:uri="http://schemas.microsoft.com/office/2006/metadata/properties"/>
-    <ds:schemaRef ds:uri="http://schemas.openxmlformats.org/package/2006/metadata/core-properties"/>
-    <ds:schemaRef ds:uri="f9d38366-44fa-4455-b38c-7d58d880822d"/>
-    <ds:schemaRef ds:uri="ec6ec6ed-b5e9-44ae-a1e4-02d3a5f2b088"/>
+    <ds:schemaRef ds:uri="http://schemas.microsoft.com/sharepoint/v3/contenttype/forms"/>
   </ds:schemaRefs>
 </ds:datastoreItem>
 </file>
@@ -11571,9 +11589,18 @@
 </file>
 
 <file path=customXml/itemProps3.xml><?xml version="1.0" encoding="utf-8"?>
-<ds:datastoreItem xmlns:ds="http://schemas.openxmlformats.org/officeDocument/2006/customXml" ds:itemID="{CF9D2C0E-8EC1-40ED-8E3B-49799F2A819F}">
+<ds:datastoreItem xmlns:ds="http://schemas.openxmlformats.org/officeDocument/2006/customXml" ds:itemID="{FC42EE84-F11C-42C7-AEE1-990C959312CE}">
   <ds:schemaRefs>
-    <ds:schemaRef ds:uri="http://schemas.microsoft.com/sharepoint/v3/contenttype/forms"/>
+    <ds:schemaRef ds:uri="http://schemas.microsoft.com/office/2006/documentManagement/types"/>
+    <ds:schemaRef ds:uri="http://www.w3.org/XML/1998/namespace"/>
+    <ds:schemaRef ds:uri="http://purl.org/dc/terms/"/>
+    <ds:schemaRef ds:uri="http://purl.org/dc/dcmitype/"/>
+    <ds:schemaRef ds:uri="http://schemas.microsoft.com/office/infopath/2007/PartnerControls"/>
+    <ds:schemaRef ds:uri="http://purl.org/dc/elements/1.1/"/>
+    <ds:schemaRef ds:uri="http://schemas.microsoft.com/office/2006/metadata/properties"/>
+    <ds:schemaRef ds:uri="http://schemas.openxmlformats.org/package/2006/metadata/core-properties"/>
+    <ds:schemaRef ds:uri="f9d38366-44fa-4455-b38c-7d58d880822d"/>
+    <ds:schemaRef ds:uri="ec6ec6ed-b5e9-44ae-a1e4-02d3a5f2b088"/>
   </ds:schemaRefs>
 </ds:datastoreItem>
 </file>
</xml_diff>

<commit_message>
Switch from Scala IDE to Intelijj
</commit_message>
<xml_diff>
--- a/1_Setup/Setup.pptx
+++ b/1_Setup/Setup.pptx
@@ -9783,7 +9783,7 @@
                   </a:schemeClr>
                 </a:solidFill>
               </a:rPr>
-              <a:t> IDEA + </a:t>
+              <a:t> IDEA + Scala plugin (File -&gt; Settings </a:t>
             </a:r>
             <a:r>
               <a:rPr lang="en-US" sz="2000" b="1">
@@ -9793,7 +9793,7 @@
                   </a:schemeClr>
                 </a:solidFill>
               </a:rPr>
-              <a:t>Scala plugin</a:t>
+              <a:t>-&gt; Plugins)</a:t>
             </a:r>
             <a:endParaRPr lang="en-US" sz="2000" b="1" dirty="0">
               <a:solidFill>
@@ -11382,12 +11382,9 @@
 </file>
 
 <file path=customXml/item1.xml><?xml version="1.0" encoding="utf-8"?>
-<?mso-contentType ?>
-<FormTemplates xmlns="http://schemas.microsoft.com/sharepoint/v3/contenttype/forms">
-  <Display>DocumentLibraryForm</Display>
-  <Edit>DocumentLibraryForm</Edit>
-  <New>DocumentLibraryForm</New>
-</FormTemplates>
+<p:properties xmlns:p="http://schemas.microsoft.com/office/2006/metadata/properties" xmlns:xsi="http://www.w3.org/2001/XMLSchema-instance" xmlns:pc="http://schemas.microsoft.com/office/infopath/2007/PartnerControls">
+  <documentManagement/>
+</p:properties>
 </file>
 
 <file path=customXml/item2.xml><?xml version="1.0" encoding="utf-8"?>
@@ -11556,15 +11553,27 @@
 </file>
 
 <file path=customXml/item3.xml><?xml version="1.0" encoding="utf-8"?>
-<p:properties xmlns:p="http://schemas.microsoft.com/office/2006/metadata/properties" xmlns:xsi="http://www.w3.org/2001/XMLSchema-instance" xmlns:pc="http://schemas.microsoft.com/office/infopath/2007/PartnerControls">
-  <documentManagement/>
-</p:properties>
+<?mso-contentType ?>
+<FormTemplates xmlns="http://schemas.microsoft.com/sharepoint/v3/contenttype/forms">
+  <Display>DocumentLibraryForm</Display>
+  <Edit>DocumentLibraryForm</Edit>
+  <New>DocumentLibraryForm</New>
+</FormTemplates>
 </file>
 
 <file path=customXml/itemProps1.xml><?xml version="1.0" encoding="utf-8"?>
-<ds:datastoreItem xmlns:ds="http://schemas.openxmlformats.org/officeDocument/2006/customXml" ds:itemID="{CF9D2C0E-8EC1-40ED-8E3B-49799F2A819F}">
+<ds:datastoreItem xmlns:ds="http://schemas.openxmlformats.org/officeDocument/2006/customXml" ds:itemID="{FC42EE84-F11C-42C7-AEE1-990C959312CE}">
   <ds:schemaRefs>
-    <ds:schemaRef ds:uri="http://schemas.microsoft.com/sharepoint/v3/contenttype/forms"/>
+    <ds:schemaRef ds:uri="http://schemas.microsoft.com/office/2006/documentManagement/types"/>
+    <ds:schemaRef ds:uri="http://www.w3.org/XML/1998/namespace"/>
+    <ds:schemaRef ds:uri="http://purl.org/dc/terms/"/>
+    <ds:schemaRef ds:uri="http://purl.org/dc/dcmitype/"/>
+    <ds:schemaRef ds:uri="http://schemas.microsoft.com/office/infopath/2007/PartnerControls"/>
+    <ds:schemaRef ds:uri="http://purl.org/dc/elements/1.1/"/>
+    <ds:schemaRef ds:uri="http://schemas.microsoft.com/office/2006/metadata/properties"/>
+    <ds:schemaRef ds:uri="http://schemas.openxmlformats.org/package/2006/metadata/core-properties"/>
+    <ds:schemaRef ds:uri="f9d38366-44fa-4455-b38c-7d58d880822d"/>
+    <ds:schemaRef ds:uri="ec6ec6ed-b5e9-44ae-a1e4-02d3a5f2b088"/>
   </ds:schemaRefs>
 </ds:datastoreItem>
 </file>
@@ -11589,18 +11598,9 @@
 </file>
 
 <file path=customXml/itemProps3.xml><?xml version="1.0" encoding="utf-8"?>
-<ds:datastoreItem xmlns:ds="http://schemas.openxmlformats.org/officeDocument/2006/customXml" ds:itemID="{FC42EE84-F11C-42C7-AEE1-990C959312CE}">
+<ds:datastoreItem xmlns:ds="http://schemas.openxmlformats.org/officeDocument/2006/customXml" ds:itemID="{CF9D2C0E-8EC1-40ED-8E3B-49799F2A819F}">
   <ds:schemaRefs>
-    <ds:schemaRef ds:uri="http://schemas.microsoft.com/office/2006/documentManagement/types"/>
-    <ds:schemaRef ds:uri="http://www.w3.org/XML/1998/namespace"/>
-    <ds:schemaRef ds:uri="http://purl.org/dc/terms/"/>
-    <ds:schemaRef ds:uri="http://purl.org/dc/dcmitype/"/>
-    <ds:schemaRef ds:uri="http://schemas.microsoft.com/office/infopath/2007/PartnerControls"/>
-    <ds:schemaRef ds:uri="http://purl.org/dc/elements/1.1/"/>
-    <ds:schemaRef ds:uri="http://schemas.microsoft.com/office/2006/metadata/properties"/>
-    <ds:schemaRef ds:uri="http://schemas.openxmlformats.org/package/2006/metadata/core-properties"/>
-    <ds:schemaRef ds:uri="f9d38366-44fa-4455-b38c-7d58d880822d"/>
-    <ds:schemaRef ds:uri="ec6ec6ed-b5e9-44ae-a1e4-02d3a5f2b088"/>
+    <ds:schemaRef ds:uri="http://schemas.microsoft.com/sharepoint/v3/contenttype/forms"/>
   </ds:schemaRefs>
 </ds:datastoreItem>
 </file>
</xml_diff>

<commit_message>
Add spark streaming with clickstream.
</commit_message>
<xml_diff>
--- a/1_Setup/Setup.pptx
+++ b/1_Setup/Setup.pptx
@@ -9731,7 +9731,7 @@
                   </a:schemeClr>
                 </a:solidFill>
               </a:rPr>
-              <a:t>Download SPARK + SPARK_HOME + PATH</a:t>
+              <a:t>Download SPARK 2.4 + SPARK_HOME + PATH</a:t>
             </a:r>
           </a:p>
           <a:p>
@@ -9783,25 +9783,8 @@
                   </a:schemeClr>
                 </a:solidFill>
               </a:rPr>
-              <a:t> IDEA + Scala plugin (File -&gt; Settings </a:t>
+              <a:t> IDEA 2019 + Scala plugin (File -&gt; Settings -&gt; Plugins)</a:t>
             </a:r>
-            <a:r>
-              <a:rPr lang="en-US" sz="2000" b="1">
-                <a:solidFill>
-                  <a:schemeClr val="bg2">
-                    <a:lumMod val="50000"/>
-                  </a:schemeClr>
-                </a:solidFill>
-              </a:rPr>
-              <a:t>-&gt; Plugins)</a:t>
-            </a:r>
-            <a:endParaRPr lang="en-US" sz="2000" b="1" dirty="0">
-              <a:solidFill>
-                <a:schemeClr val="bg2">
-                  <a:lumMod val="50000"/>
-                </a:schemeClr>
-              </a:solidFill>
-            </a:endParaRPr>
           </a:p>
         </p:txBody>
       </p:sp>
@@ -11382,9 +11365,12 @@
 </file>
 
 <file path=customXml/item1.xml><?xml version="1.0" encoding="utf-8"?>
-<p:properties xmlns:p="http://schemas.microsoft.com/office/2006/metadata/properties" xmlns:xsi="http://www.w3.org/2001/XMLSchema-instance" xmlns:pc="http://schemas.microsoft.com/office/infopath/2007/PartnerControls">
-  <documentManagement/>
-</p:properties>
+<?mso-contentType ?>
+<FormTemplates xmlns="http://schemas.microsoft.com/sharepoint/v3/contenttype/forms">
+  <Display>DocumentLibraryForm</Display>
+  <Edit>DocumentLibraryForm</Edit>
+  <New>DocumentLibraryForm</New>
+</FormTemplates>
 </file>
 
 <file path=customXml/item2.xml><?xml version="1.0" encoding="utf-8"?>
@@ -11553,27 +11539,15 @@
 </file>
 
 <file path=customXml/item3.xml><?xml version="1.0" encoding="utf-8"?>
-<?mso-contentType ?>
-<FormTemplates xmlns="http://schemas.microsoft.com/sharepoint/v3/contenttype/forms">
-  <Display>DocumentLibraryForm</Display>
-  <Edit>DocumentLibraryForm</Edit>
-  <New>DocumentLibraryForm</New>
-</FormTemplates>
+<p:properties xmlns:p="http://schemas.microsoft.com/office/2006/metadata/properties" xmlns:xsi="http://www.w3.org/2001/XMLSchema-instance" xmlns:pc="http://schemas.microsoft.com/office/infopath/2007/PartnerControls">
+  <documentManagement/>
+</p:properties>
 </file>
 
 <file path=customXml/itemProps1.xml><?xml version="1.0" encoding="utf-8"?>
-<ds:datastoreItem xmlns:ds="http://schemas.openxmlformats.org/officeDocument/2006/customXml" ds:itemID="{FC42EE84-F11C-42C7-AEE1-990C959312CE}">
+<ds:datastoreItem xmlns:ds="http://schemas.openxmlformats.org/officeDocument/2006/customXml" ds:itemID="{CF9D2C0E-8EC1-40ED-8E3B-49799F2A819F}">
   <ds:schemaRefs>
-    <ds:schemaRef ds:uri="http://schemas.microsoft.com/office/2006/documentManagement/types"/>
-    <ds:schemaRef ds:uri="http://www.w3.org/XML/1998/namespace"/>
-    <ds:schemaRef ds:uri="http://purl.org/dc/terms/"/>
-    <ds:schemaRef ds:uri="http://purl.org/dc/dcmitype/"/>
-    <ds:schemaRef ds:uri="http://schemas.microsoft.com/office/infopath/2007/PartnerControls"/>
-    <ds:schemaRef ds:uri="http://purl.org/dc/elements/1.1/"/>
-    <ds:schemaRef ds:uri="http://schemas.microsoft.com/office/2006/metadata/properties"/>
-    <ds:schemaRef ds:uri="http://schemas.openxmlformats.org/package/2006/metadata/core-properties"/>
-    <ds:schemaRef ds:uri="f9d38366-44fa-4455-b38c-7d58d880822d"/>
-    <ds:schemaRef ds:uri="ec6ec6ed-b5e9-44ae-a1e4-02d3a5f2b088"/>
+    <ds:schemaRef ds:uri="http://schemas.microsoft.com/sharepoint/v3/contenttype/forms"/>
   </ds:schemaRefs>
 </ds:datastoreItem>
 </file>
@@ -11598,9 +11572,18 @@
 </file>
 
 <file path=customXml/itemProps3.xml><?xml version="1.0" encoding="utf-8"?>
-<ds:datastoreItem xmlns:ds="http://schemas.openxmlformats.org/officeDocument/2006/customXml" ds:itemID="{CF9D2C0E-8EC1-40ED-8E3B-49799F2A819F}">
+<ds:datastoreItem xmlns:ds="http://schemas.openxmlformats.org/officeDocument/2006/customXml" ds:itemID="{FC42EE84-F11C-42C7-AEE1-990C959312CE}">
   <ds:schemaRefs>
-    <ds:schemaRef ds:uri="http://schemas.microsoft.com/sharepoint/v3/contenttype/forms"/>
+    <ds:schemaRef ds:uri="http://schemas.microsoft.com/office/2006/documentManagement/types"/>
+    <ds:schemaRef ds:uri="http://www.w3.org/XML/1998/namespace"/>
+    <ds:schemaRef ds:uri="http://purl.org/dc/terms/"/>
+    <ds:schemaRef ds:uri="http://purl.org/dc/dcmitype/"/>
+    <ds:schemaRef ds:uri="http://schemas.microsoft.com/office/infopath/2007/PartnerControls"/>
+    <ds:schemaRef ds:uri="http://purl.org/dc/elements/1.1/"/>
+    <ds:schemaRef ds:uri="http://schemas.microsoft.com/office/2006/metadata/properties"/>
+    <ds:schemaRef ds:uri="http://schemas.openxmlformats.org/package/2006/metadata/core-properties"/>
+    <ds:schemaRef ds:uri="f9d38366-44fa-4455-b38c-7d58d880822d"/>
+    <ds:schemaRef ds:uri="ec6ec6ed-b5e9-44ae-a1e4-02d3a5f2b088"/>
   </ds:schemaRefs>
 </ds:datastoreItem>
 </file>
</xml_diff>